<commit_message>
DeveloperGuide.adoc: update diagrams, spelling error
</commit_message>
<xml_diff>
--- a/docs/diagrams/HomeSequenceDiagram.pptx
+++ b/docs/diagrams/HomeSequenceDiagram.pptx
@@ -106,7 +106,18 @@
   </p:defaultTextStyle>
   <p:extLst>
     <p:ext uri="{EFAFB233-063F-42B5-8137-9DF3F51BA10A}">
-      <p15:sldGuideLst xmlns:p15="http://schemas.microsoft.com/office/powerpoint/2012/main" xmlns=""/>
+      <p15:sldGuideLst xmlns:p15="http://schemas.microsoft.com/office/powerpoint/2012/main">
+        <p15:guide id="1" orient="horz" pos="2160">
+          <p15:clr>
+            <a:srgbClr val="A4A3A4"/>
+          </p15:clr>
+        </p15:guide>
+        <p15:guide id="2" pos="3840">
+          <p15:clr>
+            <a:srgbClr val="A4A3A4"/>
+          </p15:clr>
+        </p15:guide>
+      </p15:sldGuideLst>
     </p:ext>
   </p:extLst>
 </p:presentation>
@@ -243,7 +254,7 @@
           <a:p>
             <a:fld id="{6687146F-AC1A-BE4F-93FD-8B395688E13E}" type="datetimeFigureOut">
               <a:rPr lang="en-US" smtClean="0"/>
-              <a:t>11/11/2017</a:t>
+              <a:t>11/13/17</a:t>
             </a:fld>
             <a:endParaRPr lang="en-US"/>
           </a:p>
@@ -413,7 +424,7 @@
           <a:p>
             <a:fld id="{6687146F-AC1A-BE4F-93FD-8B395688E13E}" type="datetimeFigureOut">
               <a:rPr lang="en-US" smtClean="0"/>
-              <a:t>11/11/2017</a:t>
+              <a:t>11/13/17</a:t>
             </a:fld>
             <a:endParaRPr lang="en-US"/>
           </a:p>
@@ -593,7 +604,7 @@
           <a:p>
             <a:fld id="{6687146F-AC1A-BE4F-93FD-8B395688E13E}" type="datetimeFigureOut">
               <a:rPr lang="en-US" smtClean="0"/>
-              <a:t>11/11/2017</a:t>
+              <a:t>11/13/17</a:t>
             </a:fld>
             <a:endParaRPr lang="en-US"/>
           </a:p>
@@ -763,7 +774,7 @@
           <a:p>
             <a:fld id="{6687146F-AC1A-BE4F-93FD-8B395688E13E}" type="datetimeFigureOut">
               <a:rPr lang="en-US" smtClean="0"/>
-              <a:t>11/11/2017</a:t>
+              <a:t>11/13/17</a:t>
             </a:fld>
             <a:endParaRPr lang="en-US"/>
           </a:p>
@@ -1009,7 +1020,7 @@
           <a:p>
             <a:fld id="{6687146F-AC1A-BE4F-93FD-8B395688E13E}" type="datetimeFigureOut">
               <a:rPr lang="en-US" smtClean="0"/>
-              <a:t>11/11/2017</a:t>
+              <a:t>11/13/17</a:t>
             </a:fld>
             <a:endParaRPr lang="en-US"/>
           </a:p>
@@ -1241,7 +1252,7 @@
           <a:p>
             <a:fld id="{6687146F-AC1A-BE4F-93FD-8B395688E13E}" type="datetimeFigureOut">
               <a:rPr lang="en-US" smtClean="0"/>
-              <a:t>11/11/2017</a:t>
+              <a:t>11/13/17</a:t>
             </a:fld>
             <a:endParaRPr lang="en-US"/>
           </a:p>
@@ -1608,7 +1619,7 @@
           <a:p>
             <a:fld id="{6687146F-AC1A-BE4F-93FD-8B395688E13E}" type="datetimeFigureOut">
               <a:rPr lang="en-US" smtClean="0"/>
-              <a:t>11/11/2017</a:t>
+              <a:t>11/13/17</a:t>
             </a:fld>
             <a:endParaRPr lang="en-US"/>
           </a:p>
@@ -1726,7 +1737,7 @@
           <a:p>
             <a:fld id="{6687146F-AC1A-BE4F-93FD-8B395688E13E}" type="datetimeFigureOut">
               <a:rPr lang="en-US" smtClean="0"/>
-              <a:t>11/11/2017</a:t>
+              <a:t>11/13/17</a:t>
             </a:fld>
             <a:endParaRPr lang="en-US"/>
           </a:p>
@@ -1821,7 +1832,7 @@
           <a:p>
             <a:fld id="{6687146F-AC1A-BE4F-93FD-8B395688E13E}" type="datetimeFigureOut">
               <a:rPr lang="en-US" smtClean="0"/>
-              <a:t>11/11/2017</a:t>
+              <a:t>11/13/17</a:t>
             </a:fld>
             <a:endParaRPr lang="en-US"/>
           </a:p>
@@ -2098,7 +2109,7 @@
           <a:p>
             <a:fld id="{6687146F-AC1A-BE4F-93FD-8B395688E13E}" type="datetimeFigureOut">
               <a:rPr lang="en-US" smtClean="0"/>
-              <a:t>11/11/2017</a:t>
+              <a:t>11/13/17</a:t>
             </a:fld>
             <a:endParaRPr lang="en-US"/>
           </a:p>
@@ -2351,7 +2362,7 @@
           <a:p>
             <a:fld id="{6687146F-AC1A-BE4F-93FD-8B395688E13E}" type="datetimeFigureOut">
               <a:rPr lang="en-US" smtClean="0"/>
-              <a:t>11/11/2017</a:t>
+              <a:t>11/13/17</a:t>
             </a:fld>
             <a:endParaRPr lang="en-US"/>
           </a:p>
@@ -2564,7 +2575,7 @@
           <a:p>
             <a:fld id="{6687146F-AC1A-BE4F-93FD-8B395688E13E}" type="datetimeFigureOut">
               <a:rPr lang="en-US" smtClean="0"/>
-              <a:t>11/11/2017</a:t>
+              <a:t>11/13/17</a:t>
             </a:fld>
             <a:endParaRPr lang="en-US"/>
           </a:p>
@@ -3035,7 +3046,7 @@
           <p:cNvPr id="64" name="Rectangle 62">
             <a:extLst>
               <a:ext uri="{FF2B5EF4-FFF2-40B4-BE49-F238E27FC236}">
-                <a16:creationId xmlns="" xmlns:a16="http://schemas.microsoft.com/office/drawing/2014/main" id="{741E2D67-73B2-4B6C-A036-12E2C5588EC5}"/>
+                <a16:creationId xmlns:a16="http://schemas.microsoft.com/office/drawing/2014/main" xmlns="" id="{741E2D67-73B2-4B6C-A036-12E2C5588EC5}"/>
               </a:ext>
             </a:extLst>
           </p:cNvPr>
@@ -3100,7 +3111,7 @@
           <p:cNvPr id="65" name="Straight Connector 64">
             <a:extLst>
               <a:ext uri="{FF2B5EF4-FFF2-40B4-BE49-F238E27FC236}">
-                <a16:creationId xmlns="" xmlns:a16="http://schemas.microsoft.com/office/drawing/2014/main" id="{D37C68E5-A242-4C13-9304-0D49AB0456A0}"/>
+                <a16:creationId xmlns:a16="http://schemas.microsoft.com/office/drawing/2014/main" xmlns="" id="{D37C68E5-A242-4C13-9304-0D49AB0456A0}"/>
               </a:ext>
             </a:extLst>
           </p:cNvPr>
@@ -3146,7 +3157,7 @@
           <p:cNvPr id="66" name="Rectangle 65">
             <a:extLst>
               <a:ext uri="{FF2B5EF4-FFF2-40B4-BE49-F238E27FC236}">
-                <a16:creationId xmlns="" xmlns:a16="http://schemas.microsoft.com/office/drawing/2014/main" id="{9564936E-EA3F-4E01-8C27-BCA028C109F9}"/>
+                <a16:creationId xmlns:a16="http://schemas.microsoft.com/office/drawing/2014/main" xmlns="" id="{9564936E-EA3F-4E01-8C27-BCA028C109F9}"/>
               </a:ext>
             </a:extLst>
           </p:cNvPr>
@@ -3199,7 +3210,7 @@
           <p:cNvPr id="67" name="Rectangle 62">
             <a:extLst>
               <a:ext uri="{FF2B5EF4-FFF2-40B4-BE49-F238E27FC236}">
-                <a16:creationId xmlns="" xmlns:a16="http://schemas.microsoft.com/office/drawing/2014/main" id="{E55E9040-E44A-44A6-8434-AA7219C768FA}"/>
+                <a16:creationId xmlns:a16="http://schemas.microsoft.com/office/drawing/2014/main" xmlns="" id="{E55E9040-E44A-44A6-8434-AA7219C768FA}"/>
               </a:ext>
             </a:extLst>
           </p:cNvPr>
@@ -3264,7 +3275,7 @@
           <p:cNvPr id="71" name="Straight Connector 70">
             <a:extLst>
               <a:ext uri="{FF2B5EF4-FFF2-40B4-BE49-F238E27FC236}">
-                <a16:creationId xmlns="" xmlns:a16="http://schemas.microsoft.com/office/drawing/2014/main" id="{1DAD3320-EE85-4BBF-89D0-EF0A26024595}"/>
+                <a16:creationId xmlns:a16="http://schemas.microsoft.com/office/drawing/2014/main" xmlns="" id="{1DAD3320-EE85-4BBF-89D0-EF0A26024595}"/>
               </a:ext>
             </a:extLst>
           </p:cNvPr>
@@ -3310,7 +3321,7 @@
           <p:cNvPr id="72" name="Rectangle 71">
             <a:extLst>
               <a:ext uri="{FF2B5EF4-FFF2-40B4-BE49-F238E27FC236}">
-                <a16:creationId xmlns="" xmlns:a16="http://schemas.microsoft.com/office/drawing/2014/main" id="{2CF79C74-77D3-4E09-BF29-65E2A2E12BC1}"/>
+                <a16:creationId xmlns:a16="http://schemas.microsoft.com/office/drawing/2014/main" xmlns="" id="{2CF79C74-77D3-4E09-BF29-65E2A2E12BC1}"/>
               </a:ext>
             </a:extLst>
           </p:cNvPr>
@@ -3363,7 +3374,7 @@
           <p:cNvPr id="94" name="Rectangle 62">
             <a:extLst>
               <a:ext uri="{FF2B5EF4-FFF2-40B4-BE49-F238E27FC236}">
-                <a16:creationId xmlns="" xmlns:a16="http://schemas.microsoft.com/office/drawing/2014/main" id="{B5C664FA-745A-4246-AAF8-975A423AEB2D}"/>
+                <a16:creationId xmlns:a16="http://schemas.microsoft.com/office/drawing/2014/main" xmlns="" id="{B5C664FA-745A-4246-AAF8-975A423AEB2D}"/>
               </a:ext>
             </a:extLst>
           </p:cNvPr>
@@ -3428,7 +3439,7 @@
           <p:cNvPr id="98" name="Straight Connector 97">
             <a:extLst>
               <a:ext uri="{FF2B5EF4-FFF2-40B4-BE49-F238E27FC236}">
-                <a16:creationId xmlns="" xmlns:a16="http://schemas.microsoft.com/office/drawing/2014/main" id="{041F06FF-21A6-4756-AA64-F2413B2A2073}"/>
+                <a16:creationId xmlns:a16="http://schemas.microsoft.com/office/drawing/2014/main" xmlns="" id="{041F06FF-21A6-4756-AA64-F2413B2A2073}"/>
               </a:ext>
             </a:extLst>
           </p:cNvPr>
@@ -3473,7 +3484,7 @@
           <p:cNvPr id="99" name="Rectangle 98">
             <a:extLst>
               <a:ext uri="{FF2B5EF4-FFF2-40B4-BE49-F238E27FC236}">
-                <a16:creationId xmlns="" xmlns:a16="http://schemas.microsoft.com/office/drawing/2014/main" id="{5E910292-90A2-48AE-8AAA-D58AAF550751}"/>
+                <a16:creationId xmlns:a16="http://schemas.microsoft.com/office/drawing/2014/main" xmlns="" id="{5E910292-90A2-48AE-8AAA-D58AAF550751}"/>
               </a:ext>
             </a:extLst>
           </p:cNvPr>
@@ -3526,7 +3537,7 @@
           <p:cNvPr id="100" name="Rectangle 62">
             <a:extLst>
               <a:ext uri="{FF2B5EF4-FFF2-40B4-BE49-F238E27FC236}">
-                <a16:creationId xmlns="" xmlns:a16="http://schemas.microsoft.com/office/drawing/2014/main" id="{0F9E8059-2F7D-4AF0-B59E-487FE5CBDE31}"/>
+                <a16:creationId xmlns:a16="http://schemas.microsoft.com/office/drawing/2014/main" xmlns="" id="{0F9E8059-2F7D-4AF0-B59E-487FE5CBDE31}"/>
               </a:ext>
             </a:extLst>
           </p:cNvPr>
@@ -3591,7 +3602,7 @@
           <p:cNvPr id="106" name="Rectangle 105">
             <a:extLst>
               <a:ext uri="{FF2B5EF4-FFF2-40B4-BE49-F238E27FC236}">
-                <a16:creationId xmlns="" xmlns:a16="http://schemas.microsoft.com/office/drawing/2014/main" id="{56E65239-40FF-437D-B5AF-6C0F45D70CE4}"/>
+                <a16:creationId xmlns:a16="http://schemas.microsoft.com/office/drawing/2014/main" xmlns="" id="{56E65239-40FF-437D-B5AF-6C0F45D70CE4}"/>
               </a:ext>
             </a:extLst>
           </p:cNvPr>
@@ -3644,7 +3655,7 @@
           <p:cNvPr id="111" name="Rectangle 62">
             <a:extLst>
               <a:ext uri="{FF2B5EF4-FFF2-40B4-BE49-F238E27FC236}">
-                <a16:creationId xmlns="" xmlns:a16="http://schemas.microsoft.com/office/drawing/2014/main" id="{F7E01FAE-8FEC-4E75-AF28-4D4AFDDFF41F}"/>
+                <a16:creationId xmlns:a16="http://schemas.microsoft.com/office/drawing/2014/main" xmlns="" id="{F7E01FAE-8FEC-4E75-AF28-4D4AFDDFF41F}"/>
               </a:ext>
             </a:extLst>
           </p:cNvPr>
@@ -3709,7 +3720,7 @@
           <p:cNvPr id="113" name="Straight Connector 112">
             <a:extLst>
               <a:ext uri="{FF2B5EF4-FFF2-40B4-BE49-F238E27FC236}">
-                <a16:creationId xmlns="" xmlns:a16="http://schemas.microsoft.com/office/drawing/2014/main" id="{0D301A41-389B-4B53-87FA-143855080D68}"/>
+                <a16:creationId xmlns:a16="http://schemas.microsoft.com/office/drawing/2014/main" xmlns="" id="{0D301A41-389B-4B53-87FA-143855080D68}"/>
               </a:ext>
             </a:extLst>
           </p:cNvPr>
@@ -3754,7 +3765,7 @@
           <p:cNvPr id="114" name="Rectangle 113">
             <a:extLst>
               <a:ext uri="{FF2B5EF4-FFF2-40B4-BE49-F238E27FC236}">
-                <a16:creationId xmlns="" xmlns:a16="http://schemas.microsoft.com/office/drawing/2014/main" id="{9A17EB3D-7E38-4656-BC55-945883A8456C}"/>
+                <a16:creationId xmlns:a16="http://schemas.microsoft.com/office/drawing/2014/main" xmlns="" id="{9A17EB3D-7E38-4656-BC55-945883A8456C}"/>
               </a:ext>
             </a:extLst>
           </p:cNvPr>
@@ -3807,7 +3818,7 @@
           <p:cNvPr id="117" name="Rectangle 116">
             <a:extLst>
               <a:ext uri="{FF2B5EF4-FFF2-40B4-BE49-F238E27FC236}">
-                <a16:creationId xmlns="" xmlns:a16="http://schemas.microsoft.com/office/drawing/2014/main" id="{3AAC0CCA-28D3-4549-9CC7-D0FD025F3C74}"/>
+                <a16:creationId xmlns:a16="http://schemas.microsoft.com/office/drawing/2014/main" xmlns="" id="{3AAC0CCA-28D3-4549-9CC7-D0FD025F3C74}"/>
               </a:ext>
             </a:extLst>
           </p:cNvPr>
@@ -3860,7 +3871,7 @@
           <p:cNvPr id="119" name="Straight Arrow Connector 118">
             <a:extLst>
               <a:ext uri="{FF2B5EF4-FFF2-40B4-BE49-F238E27FC236}">
-                <a16:creationId xmlns="" xmlns:a16="http://schemas.microsoft.com/office/drawing/2014/main" id="{613ED78B-175D-4368-B5DA-4D0BC1CB4E64}"/>
+                <a16:creationId xmlns:a16="http://schemas.microsoft.com/office/drawing/2014/main" xmlns="" id="{613ED78B-175D-4368-B5DA-4D0BC1CB4E64}"/>
               </a:ext>
             </a:extLst>
           </p:cNvPr>
@@ -3904,7 +3915,7 @@
           <p:cNvPr id="121" name="Straight Arrow Connector 120">
             <a:extLst>
               <a:ext uri="{FF2B5EF4-FFF2-40B4-BE49-F238E27FC236}">
-                <a16:creationId xmlns="" xmlns:a16="http://schemas.microsoft.com/office/drawing/2014/main" id="{BD1140D6-9E9B-456D-9912-AA4F20B45D60}"/>
+                <a16:creationId xmlns:a16="http://schemas.microsoft.com/office/drawing/2014/main" xmlns="" id="{BD1140D6-9E9B-456D-9912-AA4F20B45D60}"/>
               </a:ext>
             </a:extLst>
           </p:cNvPr>
@@ -3948,7 +3959,7 @@
           <p:cNvPr id="124" name="Straight Arrow Connector 123">
             <a:extLst>
               <a:ext uri="{FF2B5EF4-FFF2-40B4-BE49-F238E27FC236}">
-                <a16:creationId xmlns="" xmlns:a16="http://schemas.microsoft.com/office/drawing/2014/main" id="{6C53DCD4-2257-46D2-A176-5F7B4AD5BD51}"/>
+                <a16:creationId xmlns:a16="http://schemas.microsoft.com/office/drawing/2014/main" xmlns="" id="{6C53DCD4-2257-46D2-A176-5F7B4AD5BD51}"/>
               </a:ext>
             </a:extLst>
           </p:cNvPr>
@@ -3992,7 +4003,7 @@
           <p:cNvPr id="125" name="Straight Arrow Connector 124">
             <a:extLst>
               <a:ext uri="{FF2B5EF4-FFF2-40B4-BE49-F238E27FC236}">
-                <a16:creationId xmlns="" xmlns:a16="http://schemas.microsoft.com/office/drawing/2014/main" id="{43540F4E-4B33-4B07-89BA-1DFBD850B073}"/>
+                <a16:creationId xmlns:a16="http://schemas.microsoft.com/office/drawing/2014/main" xmlns="" id="{43540F4E-4B33-4B07-89BA-1DFBD850B073}"/>
               </a:ext>
             </a:extLst>
           </p:cNvPr>
@@ -4036,7 +4047,7 @@
           <p:cNvPr id="126" name="Straight Arrow Connector 125">
             <a:extLst>
               <a:ext uri="{FF2B5EF4-FFF2-40B4-BE49-F238E27FC236}">
-                <a16:creationId xmlns="" xmlns:a16="http://schemas.microsoft.com/office/drawing/2014/main" id="{E0113791-EBBF-4B90-A7E2-479E22575037}"/>
+                <a16:creationId xmlns:a16="http://schemas.microsoft.com/office/drawing/2014/main" xmlns="" id="{E0113791-EBBF-4B90-A7E2-479E22575037}"/>
               </a:ext>
             </a:extLst>
           </p:cNvPr>
@@ -4080,7 +4091,7 @@
           <p:cNvPr id="128" name="TextBox 127">
             <a:extLst>
               <a:ext uri="{FF2B5EF4-FFF2-40B4-BE49-F238E27FC236}">
-                <a16:creationId xmlns="" xmlns:a16="http://schemas.microsoft.com/office/drawing/2014/main" id="{A9FA6633-9E26-47D2-B912-14885FF66EFC}"/>
+                <a16:creationId xmlns:a16="http://schemas.microsoft.com/office/drawing/2014/main" xmlns="" id="{A9FA6633-9E26-47D2-B912-14885FF66EFC}"/>
               </a:ext>
             </a:extLst>
           </p:cNvPr>
@@ -4117,23 +4128,7 @@
                   <a:srgbClr val="0070C0"/>
                 </a:solidFill>
               </a:rPr>
-              <a:t>(“</a:t>
-            </a:r>
-            <a:r>
-              <a:rPr lang="en-US" sz="800" dirty="0" smtClean="0">
-                <a:solidFill>
-                  <a:srgbClr val="0070C0"/>
-                </a:solidFill>
-              </a:rPr>
-              <a:t>home</a:t>
-            </a:r>
-            <a:r>
-              <a:rPr lang="en-US" sz="800" dirty="0" smtClean="0">
-                <a:solidFill>
-                  <a:srgbClr val="0070C0"/>
-                </a:solidFill>
-              </a:rPr>
-              <a:t>”)</a:t>
+              <a:t>(“home”)</a:t>
             </a:r>
             <a:endParaRPr lang="en-US" sz="800" dirty="0">
               <a:solidFill>
@@ -4148,7 +4143,7 @@
           <p:cNvPr id="129" name="TextBox 128">
             <a:extLst>
               <a:ext uri="{FF2B5EF4-FFF2-40B4-BE49-F238E27FC236}">
-                <a16:creationId xmlns="" xmlns:a16="http://schemas.microsoft.com/office/drawing/2014/main" id="{95F15B0D-BF26-4101-9A88-0251A744599E}"/>
+                <a16:creationId xmlns:a16="http://schemas.microsoft.com/office/drawing/2014/main" xmlns="" id="{95F15B0D-BF26-4101-9A88-0251A744599E}"/>
               </a:ext>
             </a:extLst>
           </p:cNvPr>
@@ -4185,23 +4180,7 @@
                   <a:srgbClr val="0070C0"/>
                 </a:solidFill>
               </a:rPr>
-              <a:t>(“</a:t>
-            </a:r>
-            <a:r>
-              <a:rPr lang="en-US" sz="800" dirty="0" smtClean="0">
-                <a:solidFill>
-                  <a:srgbClr val="0070C0"/>
-                </a:solidFill>
-              </a:rPr>
-              <a:t>home</a:t>
-            </a:r>
-            <a:r>
-              <a:rPr lang="en-US" sz="800" dirty="0" smtClean="0">
-                <a:solidFill>
-                  <a:srgbClr val="0070C0"/>
-                </a:solidFill>
-              </a:rPr>
-              <a:t>”)</a:t>
+              <a:t>(“home”)</a:t>
             </a:r>
             <a:endParaRPr lang="en-US" sz="800" dirty="0">
               <a:solidFill>
@@ -4216,7 +4195,7 @@
           <p:cNvPr id="131" name="Straight Arrow Connector 130">
             <a:extLst>
               <a:ext uri="{FF2B5EF4-FFF2-40B4-BE49-F238E27FC236}">
-                <a16:creationId xmlns="" xmlns:a16="http://schemas.microsoft.com/office/drawing/2014/main" id="{20EA7243-3BC2-4710-811B-C7C03A9A4BD8}"/>
+                <a16:creationId xmlns:a16="http://schemas.microsoft.com/office/drawing/2014/main" xmlns="" id="{20EA7243-3BC2-4710-811B-C7C03A9A4BD8}"/>
               </a:ext>
             </a:extLst>
           </p:cNvPr>
@@ -4263,7 +4242,7 @@
           <p:cNvPr id="134" name="Straight Arrow Connector 133">
             <a:extLst>
               <a:ext uri="{FF2B5EF4-FFF2-40B4-BE49-F238E27FC236}">
-                <a16:creationId xmlns="" xmlns:a16="http://schemas.microsoft.com/office/drawing/2014/main" id="{D7323070-8EB6-4379-B6A5-9F8F822C784E}"/>
+                <a16:creationId xmlns:a16="http://schemas.microsoft.com/office/drawing/2014/main" xmlns="" id="{D7323070-8EB6-4379-B6A5-9F8F822C784E}"/>
               </a:ext>
             </a:extLst>
           </p:cNvPr>
@@ -4309,7 +4288,7 @@
           <p:cNvPr id="137" name="Straight Arrow Connector 136">
             <a:extLst>
               <a:ext uri="{FF2B5EF4-FFF2-40B4-BE49-F238E27FC236}">
-                <a16:creationId xmlns="" xmlns:a16="http://schemas.microsoft.com/office/drawing/2014/main" id="{CC3105E6-89ED-42F5-8664-9BF77E9A8840}"/>
+                <a16:creationId xmlns:a16="http://schemas.microsoft.com/office/drawing/2014/main" xmlns="" id="{CC3105E6-89ED-42F5-8664-9BF77E9A8840}"/>
               </a:ext>
             </a:extLst>
           </p:cNvPr>
@@ -4355,7 +4334,7 @@
           <p:cNvPr id="141" name="Straight Arrow Connector 140">
             <a:extLst>
               <a:ext uri="{FF2B5EF4-FFF2-40B4-BE49-F238E27FC236}">
-                <a16:creationId xmlns="" xmlns:a16="http://schemas.microsoft.com/office/drawing/2014/main" id="{84D22690-6A4B-4E7C-8241-1F4EF976CCFA}"/>
+                <a16:creationId xmlns:a16="http://schemas.microsoft.com/office/drawing/2014/main" xmlns="" id="{84D22690-6A4B-4E7C-8241-1F4EF976CCFA}"/>
               </a:ext>
             </a:extLst>
           </p:cNvPr>
@@ -4401,7 +4380,7 @@
           <p:cNvPr id="145" name="TextBox 144">
             <a:extLst>
               <a:ext uri="{FF2B5EF4-FFF2-40B4-BE49-F238E27FC236}">
-                <a16:creationId xmlns="" xmlns:a16="http://schemas.microsoft.com/office/drawing/2014/main" id="{31A7364C-6EDD-4B3D-95F1-148A649827BD}"/>
+                <a16:creationId xmlns:a16="http://schemas.microsoft.com/office/drawing/2014/main" xmlns="" id="{31A7364C-6EDD-4B3D-95F1-148A649827BD}"/>
               </a:ext>
             </a:extLst>
           </p:cNvPr>
@@ -4445,7 +4424,7 @@
           <p:cNvPr id="146" name="TextBox 145">
             <a:extLst>
               <a:ext uri="{FF2B5EF4-FFF2-40B4-BE49-F238E27FC236}">
-                <a16:creationId xmlns="" xmlns:a16="http://schemas.microsoft.com/office/drawing/2014/main" id="{9F78BEE1-6435-4C54-8B51-50F2A803607C}"/>
+                <a16:creationId xmlns:a16="http://schemas.microsoft.com/office/drawing/2014/main" xmlns="" id="{9F78BEE1-6435-4C54-8B51-50F2A803607C}"/>
               </a:ext>
             </a:extLst>
           </p:cNvPr>
@@ -4484,7 +4463,7 @@
           <p:cNvPr id="147" name="TextBox 146">
             <a:extLst>
               <a:ext uri="{FF2B5EF4-FFF2-40B4-BE49-F238E27FC236}">
-                <a16:creationId xmlns="" xmlns:a16="http://schemas.microsoft.com/office/drawing/2014/main" id="{06278A41-A1E8-49B0-ADD3-E2B6A17BF69C}"/>
+                <a16:creationId xmlns:a16="http://schemas.microsoft.com/office/drawing/2014/main" xmlns="" id="{06278A41-A1E8-49B0-ADD3-E2B6A17BF69C}"/>
               </a:ext>
             </a:extLst>
           </p:cNvPr>
@@ -4523,7 +4502,7 @@
           <p:cNvPr id="148" name="Straight Arrow Connector 147">
             <a:extLst>
               <a:ext uri="{FF2B5EF4-FFF2-40B4-BE49-F238E27FC236}">
-                <a16:creationId xmlns="" xmlns:a16="http://schemas.microsoft.com/office/drawing/2014/main" id="{C681C4E4-5153-4269-A3C3-4B070DBC29DA}"/>
+                <a16:creationId xmlns:a16="http://schemas.microsoft.com/office/drawing/2014/main" xmlns="" id="{C681C4E4-5153-4269-A3C3-4B070DBC29DA}"/>
               </a:ext>
             </a:extLst>
           </p:cNvPr>
@@ -4569,7 +4548,7 @@
           <p:cNvPr id="151" name="TextBox 150">
             <a:extLst>
               <a:ext uri="{FF2B5EF4-FFF2-40B4-BE49-F238E27FC236}">
-                <a16:creationId xmlns="" xmlns:a16="http://schemas.microsoft.com/office/drawing/2014/main" id="{F5BB3F08-BC9E-493F-827B-1CAB8B338C8F}"/>
+                <a16:creationId xmlns:a16="http://schemas.microsoft.com/office/drawing/2014/main" xmlns="" id="{F5BB3F08-BC9E-493F-827B-1CAB8B338C8F}"/>
               </a:ext>
             </a:extLst>
           </p:cNvPr>
@@ -4608,7 +4587,7 @@
           <p:cNvPr id="154" name="Straight Arrow Connector 153">
             <a:extLst>
               <a:ext uri="{FF2B5EF4-FFF2-40B4-BE49-F238E27FC236}">
-                <a16:creationId xmlns="" xmlns:a16="http://schemas.microsoft.com/office/drawing/2014/main" id="{F9AD1C72-6154-41F8-B04B-19D73E65AA70}"/>
+                <a16:creationId xmlns:a16="http://schemas.microsoft.com/office/drawing/2014/main" xmlns="" id="{F9AD1C72-6154-41F8-B04B-19D73E65AA70}"/>
               </a:ext>
             </a:extLst>
           </p:cNvPr>
@@ -4652,7 +4631,7 @@
           <p:cNvPr id="157" name="TextBox 156">
             <a:extLst>
               <a:ext uri="{FF2B5EF4-FFF2-40B4-BE49-F238E27FC236}">
-                <a16:creationId xmlns="" xmlns:a16="http://schemas.microsoft.com/office/drawing/2014/main" id="{44DD9991-0555-4E46-B249-F5AF8E3100F8}"/>
+                <a16:creationId xmlns:a16="http://schemas.microsoft.com/office/drawing/2014/main" xmlns="" id="{44DD9991-0555-4E46-B249-F5AF8E3100F8}"/>
               </a:ext>
             </a:extLst>
           </p:cNvPr>
@@ -4687,7 +4666,7 @@
           <p:cNvPr id="46" name="TextBox 45">
             <a:extLst>
               <a:ext uri="{FF2B5EF4-FFF2-40B4-BE49-F238E27FC236}">
-                <a16:creationId xmlns="" xmlns:a16="http://schemas.microsoft.com/office/drawing/2014/main" id="{E76EE883-EEE9-4E1D-A1C8-B2B38B6F5BFA}"/>
+                <a16:creationId xmlns:a16="http://schemas.microsoft.com/office/drawing/2014/main" xmlns="" id="{E76EE883-EEE9-4E1D-A1C8-B2B38B6F5BFA}"/>
               </a:ext>
             </a:extLst>
           </p:cNvPr>
@@ -4739,7 +4718,7 @@
           <p:cNvPr id="56" name="Straight Arrow Connector 55">
             <a:extLst>
               <a:ext uri="{FF2B5EF4-FFF2-40B4-BE49-F238E27FC236}">
-                <a16:creationId xmlns="" xmlns:a16="http://schemas.microsoft.com/office/drawing/2014/main" id="{4C3CBBF1-9CC8-42D5-9668-23A8DDB181A2}"/>
+                <a16:creationId xmlns:a16="http://schemas.microsoft.com/office/drawing/2014/main" xmlns="" id="{4C3CBBF1-9CC8-42D5-9668-23A8DDB181A2}"/>
               </a:ext>
             </a:extLst>
           </p:cNvPr>
@@ -4786,7 +4765,7 @@
           <p:cNvPr id="62" name="Straight Connector 61">
             <a:extLst>
               <a:ext uri="{FF2B5EF4-FFF2-40B4-BE49-F238E27FC236}">
-                <a16:creationId xmlns:a16="http://schemas.microsoft.com/office/drawing/2014/main" xmlns="" id="{E4E1C8CA-49DF-45D8-80A5-D5C8282EE927}"/>
+                <a16:creationId xmlns="" xmlns:a16="http://schemas.microsoft.com/office/drawing/2014/main" id="{E4E1C8CA-49DF-45D8-80A5-D5C8282EE927}"/>
               </a:ext>
             </a:extLst>
           </p:cNvPr>
@@ -4831,7 +4810,7 @@
           <p:cNvPr id="53" name="TextBox 52">
             <a:extLst>
               <a:ext uri="{FF2B5EF4-FFF2-40B4-BE49-F238E27FC236}">
-                <a16:creationId xmlns="" xmlns:a16="http://schemas.microsoft.com/office/drawing/2014/main" id="{9F78BEE1-6435-4C54-8B51-50F2A803607C}"/>
+                <a16:creationId xmlns:a16="http://schemas.microsoft.com/office/drawing/2014/main" xmlns="" id="{9F78BEE1-6435-4C54-8B51-50F2A803607C}"/>
               </a:ext>
             </a:extLst>
           </p:cNvPr>
@@ -5145,7 +5124,7 @@
   <a:extraClrSchemeLst/>
   <a:extLst>
     <a:ext uri="{05A4C25C-085E-4340-85A3-A5531E510DB2}">
-      <thm15:themeFamily xmlns:thm15="http://schemas.microsoft.com/office/thememl/2012/main" xmlns="" name="Office Theme" id="{62F939B6-93AF-4DB8-9C6B-D6C7DFDC589F}" vid="{4A3C46E8-61CC-4603-A589-7422A47A8E4A}"/>
+      <thm15:themeFamily xmlns:thm15="http://schemas.microsoft.com/office/thememl/2012/main" name="Office Theme" id="{62F939B6-93AF-4DB8-9C6B-D6C7DFDC589F}" vid="{4A3C46E8-61CC-4603-A589-7422A47A8E4A}"/>
     </a:ext>
   </a:extLst>
 </a:theme>

</xml_diff>